<commit_message>
Deployed fb914a5 with MkDocs version: 1.1.2
</commit_message>
<xml_diff>
--- a/materials/htcondor/files/osgus24-htc-htcondor.pptx
+++ b/materials/htcondor/files/osgus24-htc-htcondor.pptx
@@ -250,7 +250,7 @@
           <a:p>
             <a:fld id="{F3288E7E-9231-EE4D-BFDE-DE812827A51B}" type="datetimeFigureOut">
               <a:rPr lang="en-US" smtClean="0"/>
-              <a:t>8/2/2024</a:t>
+              <a:t>8/5/2024</a:t>
             </a:fld>
             <a:endParaRPr lang="en-US"/>
           </a:p>
@@ -416,7 +416,7 @@
           <a:p>
             <a:fld id="{8294EFC0-AD85-7345-87BA-F270C95DE262}" type="datetimeFigureOut">
               <a:rPr lang="en-US" smtClean="0"/>
-              <a:t>8/2/2024</a:t>
+              <a:t>8/5/2024</a:t>
             </a:fld>
             <a:endParaRPr lang="en-US"/>
           </a:p>
@@ -2799,17 +2799,17 @@
           </a:ln>
           <a:extLst>
             <a:ext uri="{FAA26D3D-D897-4be2-8F04-BA451C77F1D7}">
-              <ma14:placeholderFlag xmlns="" xmlns:ma14="http://schemas.microsoft.com/office/mac/drawingml/2011/main" val="1"/>
+              <ma14:placeholderFlag xmlns:ma14="http://schemas.microsoft.com/office/mac/drawingml/2011/main" xmlns="" val="1"/>
             </a:ext>
             <a:ext uri="{909E8E84-426E-40dd-AFC4-6F175D3DCCD1}">
-              <a14:hiddenFill xmlns="" xmlns:a14="http://schemas.microsoft.com/office/drawing/2010/main">
+              <a14:hiddenFill xmlns:a14="http://schemas.microsoft.com/office/drawing/2010/main" xmlns="">
                 <a:solidFill>
                   <a:srgbClr val="FFFFFF"/>
                 </a:solidFill>
               </a14:hiddenFill>
             </a:ext>
             <a:ext uri="{91240B29-F687-4f45-9708-019B960494DF}">
-              <a14:hiddenLine xmlns="" xmlns:a14="http://schemas.microsoft.com/office/drawing/2010/main" w="9525">
+              <a14:hiddenLine xmlns:a14="http://schemas.microsoft.com/office/drawing/2010/main" xmlns="" w="9525">
                 <a:solidFill>
                   <a:srgbClr val="000000"/>
                 </a:solidFill>
@@ -2860,17 +2860,17 @@
           </a:ln>
           <a:extLst>
             <a:ext uri="{FAA26D3D-D897-4be2-8F04-BA451C77F1D7}">
-              <ma14:placeholderFlag xmlns="" xmlns:ma14="http://schemas.microsoft.com/office/mac/drawingml/2011/main" val="1"/>
+              <ma14:placeholderFlag xmlns:ma14="http://schemas.microsoft.com/office/mac/drawingml/2011/main" xmlns="" val="1"/>
             </a:ext>
             <a:ext uri="{909E8E84-426E-40dd-AFC4-6F175D3DCCD1}">
-              <a14:hiddenFill xmlns="" xmlns:a14="http://schemas.microsoft.com/office/drawing/2010/main">
+              <a14:hiddenFill xmlns:a14="http://schemas.microsoft.com/office/drawing/2010/main" xmlns="">
                 <a:solidFill>
                   <a:srgbClr val="FFFFFF"/>
                 </a:solidFill>
               </a14:hiddenFill>
             </a:ext>
             <a:ext uri="{91240B29-F687-4f45-9708-019B960494DF}">
-              <a14:hiddenLine xmlns="" xmlns:a14="http://schemas.microsoft.com/office/drawing/2010/main" w="9525">
+              <a14:hiddenLine xmlns:a14="http://schemas.microsoft.com/office/drawing/2010/main" xmlns="" w="9525">
                 <a:solidFill>
                   <a:srgbClr val="000000"/>
                 </a:solidFill>
@@ -2947,14 +2947,14 @@
           </a:ln>
           <a:extLst>
             <a:ext uri="{909E8E84-426E-40dd-AFC4-6F175D3DCCD1}">
-              <a14:hiddenFill xmlns="" xmlns:a14="http://schemas.microsoft.com/office/drawing/2010/main">
+              <a14:hiddenFill xmlns:a14="http://schemas.microsoft.com/office/drawing/2010/main" xmlns="">
                 <a:solidFill>
                   <a:srgbClr val="FFFFFF"/>
                 </a:solidFill>
               </a14:hiddenFill>
             </a:ext>
             <a:ext uri="{91240B29-F687-4f45-9708-019B960494DF}">
-              <a14:hiddenLine xmlns="" xmlns:a14="http://schemas.microsoft.com/office/drawing/2010/main" w="9525">
+              <a14:hiddenLine xmlns:a14="http://schemas.microsoft.com/office/drawing/2010/main" xmlns="" w="9525">
                 <a:solidFill>
                   <a:srgbClr val="000000"/>
                 </a:solidFill>
@@ -3117,14 +3117,14 @@
           </a:ln>
           <a:extLst>
             <a:ext uri="{909E8E84-426E-40dd-AFC4-6F175D3DCCD1}">
-              <a14:hiddenFill xmlns="" xmlns:a14="http://schemas.microsoft.com/office/drawing/2010/main">
+              <a14:hiddenFill xmlns:a14="http://schemas.microsoft.com/office/drawing/2010/main" xmlns="">
                 <a:solidFill>
                   <a:srgbClr val="FFFFFF"/>
                 </a:solidFill>
               </a14:hiddenFill>
             </a:ext>
             <a:ext uri="{91240B29-F687-4f45-9708-019B960494DF}">
-              <a14:hiddenLine xmlns="" xmlns:a14="http://schemas.microsoft.com/office/drawing/2010/main" w="9525">
+              <a14:hiddenLine xmlns:a14="http://schemas.microsoft.com/office/drawing/2010/main" xmlns="" w="9525">
                 <a:solidFill>
                   <a:srgbClr val="000000"/>
                 </a:solidFill>
@@ -3296,7 +3296,7 @@
           </a:ln>
           <a:extLst>
             <a:ext uri="{909E8E84-426E-40dd-AFC4-6F175D3DCCD1}">
-              <a14:hiddenFill xmlns="" xmlns:a14="http://schemas.microsoft.com/office/drawing/2010/main">
+              <a14:hiddenFill xmlns:a14="http://schemas.microsoft.com/office/drawing/2010/main" xmlns="">
                 <a:noFill/>
               </a14:hiddenFill>
             </a:ext>
@@ -22394,7 +22394,7 @@
                 <a:cs typeface="Arial"/>
                 <a:hlinkClick r:id="rId2"/>
               </a:rPr>
-              <a:t>condor_history</a:t>
+              <a:t>condor_watch_q</a:t>
             </a:r>
             <a:endParaRPr lang="en-US" sz="1050" dirty="0">
               <a:solidFill>
@@ -22801,68 +22801,6 @@
       </p:sp>
       <p:sp>
         <p:nvSpPr>
-          <p:cNvPr id="5" name="TextBox 4"/>
-          <p:cNvSpPr txBox="1"/>
-          <p:nvPr/>
-        </p:nvSpPr>
-        <p:spPr>
-          <a:xfrm>
-            <a:off x="6380315" y="4884076"/>
-            <a:ext cx="2432030" cy="253916"/>
-          </a:xfrm>
-          <a:prstGeom prst="rect">
-            <a:avLst/>
-          </a:prstGeom>
-          <a:solidFill>
-            <a:schemeClr val="bg1"/>
-          </a:solidFill>
-          <a:ln w="12700" cmpd="sng">
-            <a:solidFill>
-              <a:schemeClr val="bg1"/>
-            </a:solidFill>
-          </a:ln>
-        </p:spPr>
-        <p:txBody>
-          <a:bodyPr wrap="square" rtlCol="0">
-            <a:spAutoFit/>
-          </a:bodyPr>
-          <a:lstStyle/>
-          <a:p>
-            <a:pPr algn="r"/>
-            <a:r>
-              <a:rPr lang="en-US" sz="1050" dirty="0">
-                <a:solidFill>
-                  <a:srgbClr val="000000"/>
-                </a:solidFill>
-                <a:latin typeface="Arial"/>
-                <a:cs typeface="Arial"/>
-                <a:hlinkClick r:id="rId2"/>
-              </a:rPr>
-              <a:t>HTCondor Manual: </a:t>
-            </a:r>
-            <a:r>
-              <a:rPr lang="en-US" sz="1050" dirty="0" err="1">
-                <a:solidFill>
-                  <a:srgbClr val="000000"/>
-                </a:solidFill>
-                <a:latin typeface="Arial"/>
-                <a:cs typeface="Arial"/>
-                <a:hlinkClick r:id="rId2"/>
-              </a:rPr>
-              <a:t>condor_history</a:t>
-            </a:r>
-            <a:endParaRPr lang="en-US" sz="1050" dirty="0">
-              <a:solidFill>
-                <a:srgbClr val="000000"/>
-              </a:solidFill>
-              <a:latin typeface="Arial"/>
-              <a:cs typeface="Arial"/>
-            </a:endParaRPr>
-          </a:p>
-        </p:txBody>
-      </p:sp>
-      <p:sp>
-        <p:nvSpPr>
           <p:cNvPr id="6" name="Rectangle 5">
             <a:extLst>
               <a:ext uri="{FF2B5EF4-FFF2-40B4-BE49-F238E27FC236}">
@@ -22926,6 +22864,74 @@
               </a:solidFill>
               <a:effectLst/>
               <a:latin typeface="Arial" charset="0"/>
+            </a:endParaRPr>
+          </a:p>
+        </p:txBody>
+      </p:sp>
+      <p:sp>
+        <p:nvSpPr>
+          <p:cNvPr id="7" name="TextBox 6">
+            <a:extLst>
+              <a:ext uri="{FF2B5EF4-FFF2-40B4-BE49-F238E27FC236}">
+                <a16:creationId xmlns:a16="http://schemas.microsoft.com/office/drawing/2014/main" id="{2CA73800-A1D3-44DD-0425-9427278E0BB4}"/>
+              </a:ext>
+            </a:extLst>
+          </p:cNvPr>
+          <p:cNvSpPr txBox="1"/>
+          <p:nvPr/>
+        </p:nvSpPr>
+        <p:spPr>
+          <a:xfrm>
+            <a:off x="6380315" y="4884076"/>
+            <a:ext cx="2432030" cy="253916"/>
+          </a:xfrm>
+          <a:prstGeom prst="rect">
+            <a:avLst/>
+          </a:prstGeom>
+          <a:solidFill>
+            <a:schemeClr val="bg1"/>
+          </a:solidFill>
+          <a:ln w="12700" cmpd="sng">
+            <a:solidFill>
+              <a:schemeClr val="bg1"/>
+            </a:solidFill>
+          </a:ln>
+        </p:spPr>
+        <p:txBody>
+          <a:bodyPr wrap="square" rtlCol="0">
+            <a:spAutoFit/>
+          </a:bodyPr>
+          <a:lstStyle/>
+          <a:p>
+            <a:pPr algn="r"/>
+            <a:r>
+              <a:rPr lang="en-US" sz="1050" dirty="0">
+                <a:solidFill>
+                  <a:srgbClr val="000000"/>
+                </a:solidFill>
+                <a:latin typeface="Arial"/>
+                <a:cs typeface="Arial"/>
+                <a:hlinkClick r:id="rId2"/>
+              </a:rPr>
+              <a:t>HTCondor Manual: </a:t>
+            </a:r>
+            <a:r>
+              <a:rPr lang="en-US" sz="1050" dirty="0" err="1">
+                <a:solidFill>
+                  <a:srgbClr val="000000"/>
+                </a:solidFill>
+                <a:latin typeface="Arial"/>
+                <a:cs typeface="Arial"/>
+                <a:hlinkClick r:id="rId2"/>
+              </a:rPr>
+              <a:t>condor_watch_q</a:t>
+            </a:r>
+            <a:endParaRPr lang="en-US" sz="1050" dirty="0">
+              <a:solidFill>
+                <a:srgbClr val="000000"/>
+              </a:solidFill>
+              <a:latin typeface="Arial"/>
+              <a:cs typeface="Arial"/>
             </a:endParaRPr>
           </a:p>
         </p:txBody>
@@ -23025,68 +23031,6 @@
       </p:sp>
       <p:sp>
         <p:nvSpPr>
-          <p:cNvPr id="5" name="TextBox 4"/>
-          <p:cNvSpPr txBox="1"/>
-          <p:nvPr/>
-        </p:nvSpPr>
-        <p:spPr>
-          <a:xfrm>
-            <a:off x="6380315" y="4884076"/>
-            <a:ext cx="2432030" cy="253916"/>
-          </a:xfrm>
-          <a:prstGeom prst="rect">
-            <a:avLst/>
-          </a:prstGeom>
-          <a:solidFill>
-            <a:schemeClr val="bg1"/>
-          </a:solidFill>
-          <a:ln w="12700" cmpd="sng">
-            <a:solidFill>
-              <a:schemeClr val="bg1"/>
-            </a:solidFill>
-          </a:ln>
-        </p:spPr>
-        <p:txBody>
-          <a:bodyPr wrap="square" rtlCol="0">
-            <a:spAutoFit/>
-          </a:bodyPr>
-          <a:lstStyle/>
-          <a:p>
-            <a:pPr algn="r"/>
-            <a:r>
-              <a:rPr lang="en-US" sz="1050" dirty="0">
-                <a:solidFill>
-                  <a:srgbClr val="000000"/>
-                </a:solidFill>
-                <a:latin typeface="Arial"/>
-                <a:cs typeface="Arial"/>
-                <a:hlinkClick r:id="rId2"/>
-              </a:rPr>
-              <a:t>HTCondor Manual: </a:t>
-            </a:r>
-            <a:r>
-              <a:rPr lang="en-US" sz="1050" dirty="0" err="1">
-                <a:solidFill>
-                  <a:srgbClr val="000000"/>
-                </a:solidFill>
-                <a:latin typeface="Arial"/>
-                <a:cs typeface="Arial"/>
-                <a:hlinkClick r:id="rId2"/>
-              </a:rPr>
-              <a:t>condor_history</a:t>
-            </a:r>
-            <a:endParaRPr lang="en-US" sz="1050" dirty="0">
-              <a:solidFill>
-                <a:srgbClr val="000000"/>
-              </a:solidFill>
-              <a:latin typeface="Arial"/>
-              <a:cs typeface="Arial"/>
-            </a:endParaRPr>
-          </a:p>
-        </p:txBody>
-      </p:sp>
-      <p:sp>
-        <p:nvSpPr>
           <p:cNvPr id="6" name="Rectangle 5">
             <a:extLst>
               <a:ext uri="{FF2B5EF4-FFF2-40B4-BE49-F238E27FC236}">
@@ -23415,6 +23359,74 @@
               </a:rPr>
               <a:t>Input ^C to exit</a:t>
             </a:r>
+          </a:p>
+        </p:txBody>
+      </p:sp>
+      <p:sp>
+        <p:nvSpPr>
+          <p:cNvPr id="4" name="TextBox 3">
+            <a:extLst>
+              <a:ext uri="{FF2B5EF4-FFF2-40B4-BE49-F238E27FC236}">
+                <a16:creationId xmlns:a16="http://schemas.microsoft.com/office/drawing/2014/main" id="{103972C3-FA12-E4EE-4585-4127A584FFD3}"/>
+              </a:ext>
+            </a:extLst>
+          </p:cNvPr>
+          <p:cNvSpPr txBox="1"/>
+          <p:nvPr/>
+        </p:nvSpPr>
+        <p:spPr>
+          <a:xfrm>
+            <a:off x="6380315" y="4884076"/>
+            <a:ext cx="2432030" cy="253916"/>
+          </a:xfrm>
+          <a:prstGeom prst="rect">
+            <a:avLst/>
+          </a:prstGeom>
+          <a:solidFill>
+            <a:schemeClr val="bg1"/>
+          </a:solidFill>
+          <a:ln w="12700" cmpd="sng">
+            <a:solidFill>
+              <a:schemeClr val="bg1"/>
+            </a:solidFill>
+          </a:ln>
+        </p:spPr>
+        <p:txBody>
+          <a:bodyPr wrap="square" rtlCol="0">
+            <a:spAutoFit/>
+          </a:bodyPr>
+          <a:lstStyle/>
+          <a:p>
+            <a:pPr algn="r"/>
+            <a:r>
+              <a:rPr lang="en-US" sz="1050" dirty="0">
+                <a:solidFill>
+                  <a:srgbClr val="000000"/>
+                </a:solidFill>
+                <a:latin typeface="Arial"/>
+                <a:cs typeface="Arial"/>
+                <a:hlinkClick r:id="rId2"/>
+              </a:rPr>
+              <a:t>HTCondor Manual: </a:t>
+            </a:r>
+            <a:r>
+              <a:rPr lang="en-US" sz="1050" dirty="0" err="1">
+                <a:solidFill>
+                  <a:srgbClr val="000000"/>
+                </a:solidFill>
+                <a:latin typeface="Arial"/>
+                <a:cs typeface="Arial"/>
+                <a:hlinkClick r:id="rId2"/>
+              </a:rPr>
+              <a:t>condor_watch_q</a:t>
+            </a:r>
+            <a:endParaRPr lang="en-US" sz="1050" dirty="0">
+              <a:solidFill>
+                <a:srgbClr val="000000"/>
+              </a:solidFill>
+              <a:latin typeface="Arial"/>
+              <a:cs typeface="Arial"/>
+            </a:endParaRPr>
           </a:p>
         </p:txBody>
       </p:sp>
@@ -23544,68 +23556,6 @@
       </p:sp>
       <p:sp>
         <p:nvSpPr>
-          <p:cNvPr id="5" name="TextBox 4"/>
-          <p:cNvSpPr txBox="1"/>
-          <p:nvPr/>
-        </p:nvSpPr>
-        <p:spPr>
-          <a:xfrm>
-            <a:off x="6380315" y="4884076"/>
-            <a:ext cx="2432030" cy="253916"/>
-          </a:xfrm>
-          <a:prstGeom prst="rect">
-            <a:avLst/>
-          </a:prstGeom>
-          <a:solidFill>
-            <a:schemeClr val="bg1"/>
-          </a:solidFill>
-          <a:ln w="12700" cmpd="sng">
-            <a:solidFill>
-              <a:schemeClr val="bg1"/>
-            </a:solidFill>
-          </a:ln>
-        </p:spPr>
-        <p:txBody>
-          <a:bodyPr wrap="square" rtlCol="0">
-            <a:spAutoFit/>
-          </a:bodyPr>
-          <a:lstStyle/>
-          <a:p>
-            <a:pPr algn="r"/>
-            <a:r>
-              <a:rPr lang="en-US" sz="1050" dirty="0">
-                <a:solidFill>
-                  <a:srgbClr val="000000"/>
-                </a:solidFill>
-                <a:latin typeface="Arial"/>
-                <a:cs typeface="Arial"/>
-                <a:hlinkClick r:id="rId2"/>
-              </a:rPr>
-              <a:t>HTCondor Manual: </a:t>
-            </a:r>
-            <a:r>
-              <a:rPr lang="en-US" sz="1050" dirty="0" err="1">
-                <a:solidFill>
-                  <a:srgbClr val="000000"/>
-                </a:solidFill>
-                <a:latin typeface="Arial"/>
-                <a:cs typeface="Arial"/>
-                <a:hlinkClick r:id="rId2"/>
-              </a:rPr>
-              <a:t>condor_history</a:t>
-            </a:r>
-            <a:endParaRPr lang="en-US" sz="1050" dirty="0">
-              <a:solidFill>
-                <a:srgbClr val="000000"/>
-              </a:solidFill>
-              <a:latin typeface="Arial"/>
-              <a:cs typeface="Arial"/>
-            </a:endParaRPr>
-          </a:p>
-        </p:txBody>
-      </p:sp>
-      <p:sp>
-        <p:nvSpPr>
           <p:cNvPr id="6" name="Rectangle 5">
             <a:extLst>
               <a:ext uri="{FF2B5EF4-FFF2-40B4-BE49-F238E27FC236}">
@@ -23894,6 +23844,74 @@
               </a:rPr>
               <a:t>Input ^C to exit</a:t>
             </a:r>
+          </a:p>
+        </p:txBody>
+      </p:sp>
+      <p:sp>
+        <p:nvSpPr>
+          <p:cNvPr id="4" name="TextBox 3">
+            <a:extLst>
+              <a:ext uri="{FF2B5EF4-FFF2-40B4-BE49-F238E27FC236}">
+                <a16:creationId xmlns:a16="http://schemas.microsoft.com/office/drawing/2014/main" id="{4D9123FD-9F23-9F33-AC98-210FBC659B6B}"/>
+              </a:ext>
+            </a:extLst>
+          </p:cNvPr>
+          <p:cNvSpPr txBox="1"/>
+          <p:nvPr/>
+        </p:nvSpPr>
+        <p:spPr>
+          <a:xfrm>
+            <a:off x="6380315" y="4884076"/>
+            <a:ext cx="2432030" cy="253916"/>
+          </a:xfrm>
+          <a:prstGeom prst="rect">
+            <a:avLst/>
+          </a:prstGeom>
+          <a:solidFill>
+            <a:schemeClr val="bg1"/>
+          </a:solidFill>
+          <a:ln w="12700" cmpd="sng">
+            <a:solidFill>
+              <a:schemeClr val="bg1"/>
+            </a:solidFill>
+          </a:ln>
+        </p:spPr>
+        <p:txBody>
+          <a:bodyPr wrap="square" rtlCol="0">
+            <a:spAutoFit/>
+          </a:bodyPr>
+          <a:lstStyle/>
+          <a:p>
+            <a:pPr algn="r"/>
+            <a:r>
+              <a:rPr lang="en-US" sz="1050" dirty="0">
+                <a:solidFill>
+                  <a:srgbClr val="000000"/>
+                </a:solidFill>
+                <a:latin typeface="Arial"/>
+                <a:cs typeface="Arial"/>
+                <a:hlinkClick r:id="rId2"/>
+              </a:rPr>
+              <a:t>HTCondor Manual: </a:t>
+            </a:r>
+            <a:r>
+              <a:rPr lang="en-US" sz="1050" dirty="0" err="1">
+                <a:solidFill>
+                  <a:srgbClr val="000000"/>
+                </a:solidFill>
+                <a:latin typeface="Arial"/>
+                <a:cs typeface="Arial"/>
+                <a:hlinkClick r:id="rId2"/>
+              </a:rPr>
+              <a:t>condor_watch_q</a:t>
+            </a:r>
+            <a:endParaRPr lang="en-US" sz="1050" dirty="0">
+              <a:solidFill>
+                <a:srgbClr val="000000"/>
+              </a:solidFill>
+              <a:latin typeface="Arial"/>
+              <a:cs typeface="Arial"/>
+            </a:endParaRPr>
           </a:p>
         </p:txBody>
       </p:sp>

</xml_diff>